<commit_message>
update mock & singletone
</commit_message>
<xml_diff>
--- a/발표양식.pptx
+++ b/발표양식.pptx
@@ -5,7 +5,7 @@
     <p:sldMasterId id="2147483648" r:id="rId1"/>
   </p:sldMasterIdLst>
   <p:notesMasterIdLst>
-    <p:notesMasterId r:id="rId19"/>
+    <p:notesMasterId r:id="rId21"/>
   </p:notesMasterIdLst>
   <p:sldIdLst>
     <p:sldId id="256" r:id="rId2"/>
@@ -15,16 +15,18 @@
     <p:sldId id="265" r:id="rId6"/>
     <p:sldId id="276" r:id="rId7"/>
     <p:sldId id="277" r:id="rId8"/>
-    <p:sldId id="286" r:id="rId9"/>
-    <p:sldId id="278" r:id="rId10"/>
-    <p:sldId id="285" r:id="rId11"/>
-    <p:sldId id="287" r:id="rId12"/>
-    <p:sldId id="279" r:id="rId13"/>
-    <p:sldId id="288" r:id="rId14"/>
-    <p:sldId id="280" r:id="rId15"/>
-    <p:sldId id="289" r:id="rId16"/>
-    <p:sldId id="281" r:id="rId17"/>
-    <p:sldId id="283" r:id="rId18"/>
+    <p:sldId id="291" r:id="rId9"/>
+    <p:sldId id="286" r:id="rId10"/>
+    <p:sldId id="278" r:id="rId11"/>
+    <p:sldId id="285" r:id="rId12"/>
+    <p:sldId id="287" r:id="rId13"/>
+    <p:sldId id="279" r:id="rId14"/>
+    <p:sldId id="290" r:id="rId15"/>
+    <p:sldId id="288" r:id="rId16"/>
+    <p:sldId id="280" r:id="rId17"/>
+    <p:sldId id="289" r:id="rId18"/>
+    <p:sldId id="281" r:id="rId19"/>
+    <p:sldId id="283" r:id="rId20"/>
   </p:sldIdLst>
   <p:sldSz cx="12192000" cy="6858000"/>
   <p:notesSz cx="6858000" cy="9144000"/>
@@ -262,7 +264,7 @@
       <p15:sldGuideLst xmlns:p15="http://schemas.microsoft.com/office/powerpoint/2012/main"/>
     </p:ext>
     <p:ext uri="GoogleSlidesCustomDataVersion2">
-      <go:slidesCustomData xmlns:go="http://customooxmlschemas.google.com/" xmlns:ahyp="http://schemas.microsoft.com/office/drawing/2018/hyperlinkcolor" xmlns:p15="http://schemas.microsoft.com/office/powerpoint/2012/main" xmlns:p14="http://schemas.microsoft.com/office/powerpoint/2010/main" xmlns:com="http://schemas.openxmlformats.org/drawingml/2006/compatibility" xmlns:pvml="urn:schemas-microsoft-com:office:powerpoint" xmlns:v="urn:schemas-microsoft-com:vml" xmlns:o="urn:schemas-microsoft-com:office:office" xmlns:dgm="http://schemas.openxmlformats.org/drawingml/2006/diagram" xmlns:c="http://schemas.openxmlformats.org/drawingml/2006/chart" xmlns:mv="urn:schemas-microsoft-com:mac:vml" xmlns:mc="http://schemas.openxmlformats.org/markup-compatibility/2006" xmlns="" r:id="rId20" roundtripDataSignature="AMtx7mj5GdbxsaFl02bTEFBl/9s84/Z/Bw=="/>
+      <go:slidesCustomData xmlns="" xmlns:mc="http://schemas.openxmlformats.org/markup-compatibility/2006" xmlns:mv="urn:schemas-microsoft-com:mac:vml" xmlns:c="http://schemas.openxmlformats.org/drawingml/2006/chart" xmlns:dgm="http://schemas.openxmlformats.org/drawingml/2006/diagram" xmlns:o="urn:schemas-microsoft-com:office:office" xmlns:v="urn:schemas-microsoft-com:vml" xmlns:pvml="urn:schemas-microsoft-com:office:powerpoint" xmlns:com="http://schemas.openxmlformats.org/drawingml/2006/compatibility" xmlns:p14="http://schemas.microsoft.com/office/powerpoint/2010/main" xmlns:p15="http://schemas.microsoft.com/office/powerpoint/2012/main" xmlns:ahyp="http://schemas.microsoft.com/office/drawing/2018/hyperlinkcolor" xmlns:go="http://customooxmlschemas.google.com/" r:id="rId22" roundtripDataSignature="AMtx7mj5GdbxsaFl02bTEFBl/9s84/Z/Bw=="/>
     </p:ext>
   </p:extLst>
 </p:presentation>
@@ -5982,6 +5984,151 @@
           <a:p>
             <a:r>
               <a:rPr lang="en-US" altLang="ko-KR"/>
+              <a:t>Code Coverage</a:t>
+            </a:r>
+            <a:endParaRPr lang="ko-KR" altLang="en-US"/>
+          </a:p>
+        </p:txBody>
+      </p:sp>
+      <p:sp>
+        <p:nvSpPr>
+          <p:cNvPr id="5" name="텍스트 개체 틀 4">
+            <a:extLst>
+              <a:ext uri="{FF2B5EF4-FFF2-40B4-BE49-F238E27FC236}">
+                <a16:creationId xmlns:a16="http://schemas.microsoft.com/office/drawing/2014/main" id="{79A8F705-B49E-4835-9D21-15CBA9BA73A4}"/>
+              </a:ext>
+            </a:extLst>
+          </p:cNvPr>
+          <p:cNvSpPr>
+            <a:spLocks noGrp="1"/>
+          </p:cNvSpPr>
+          <p:nvPr>
+            <p:ph type="body" idx="1"/>
+          </p:nvPr>
+        </p:nvSpPr>
+        <p:spPr/>
+        <p:txBody>
+          <a:bodyPr/>
+          <a:lstStyle/>
+          <a:p>
+            <a:endParaRPr lang="ko-KR" altLang="en-US"/>
+          </a:p>
+        </p:txBody>
+      </p:sp>
+      <p:pic>
+        <p:nvPicPr>
+          <p:cNvPr id="13" name="그림 12">
+            <a:extLst>
+              <a:ext uri="{FF2B5EF4-FFF2-40B4-BE49-F238E27FC236}">
+                <a16:creationId xmlns:a16="http://schemas.microsoft.com/office/drawing/2014/main" id="{CF31E10F-7F66-47A1-9BDC-25651E2452A2}"/>
+              </a:ext>
+            </a:extLst>
+          </p:cNvPr>
+          <p:cNvPicPr>
+            <a:picLocks noChangeAspect="1"/>
+          </p:cNvPicPr>
+          <p:nvPr/>
+        </p:nvPicPr>
+        <p:blipFill>
+          <a:blip r:embed="rId2"/>
+          <a:stretch>
+            <a:fillRect/>
+          </a:stretch>
+        </p:blipFill>
+        <p:spPr>
+          <a:xfrm>
+            <a:off x="5863780" y="1089793"/>
+            <a:ext cx="6137324" cy="5585655"/>
+          </a:xfrm>
+          <a:prstGeom prst="rect">
+            <a:avLst/>
+          </a:prstGeom>
+        </p:spPr>
+      </p:pic>
+      <p:pic>
+        <p:nvPicPr>
+          <p:cNvPr id="15" name="그림 14">
+            <a:extLst>
+              <a:ext uri="{FF2B5EF4-FFF2-40B4-BE49-F238E27FC236}">
+                <a16:creationId xmlns:a16="http://schemas.microsoft.com/office/drawing/2014/main" id="{752AA1E4-BA23-4667-9DD2-0297A7B84EC7}"/>
+              </a:ext>
+            </a:extLst>
+          </p:cNvPr>
+          <p:cNvPicPr>
+            <a:picLocks noChangeAspect="1"/>
+          </p:cNvPicPr>
+          <p:nvPr/>
+        </p:nvPicPr>
+        <p:blipFill rotWithShape="1">
+          <a:blip r:embed="rId3"/>
+          <a:srcRect r="10457"/>
+          <a:stretch/>
+        </p:blipFill>
+        <p:spPr>
+          <a:xfrm>
+            <a:off x="0" y="1089793"/>
+            <a:ext cx="5738327" cy="4823927"/>
+          </a:xfrm>
+          <a:prstGeom prst="rect">
+            <a:avLst/>
+          </a:prstGeom>
+        </p:spPr>
+      </p:pic>
+    </p:spTree>
+    <p:extLst>
+      <p:ext uri="{BB962C8B-B14F-4D97-AF65-F5344CB8AC3E}">
+        <p14:creationId xmlns:p14="http://schemas.microsoft.com/office/powerpoint/2010/main" val="3477409895"/>
+      </p:ext>
+    </p:extLst>
+  </p:cSld>
+  <p:clrMapOvr>
+    <a:masterClrMapping/>
+  </p:clrMapOvr>
+</p:sld>
+</file>
+
+<file path=ppt/slides/slide11.xml><?xml version="1.0" encoding="utf-8"?>
+<p:sld xmlns:a="http://schemas.openxmlformats.org/drawingml/2006/main" xmlns:r="http://schemas.openxmlformats.org/officeDocument/2006/relationships" xmlns:p="http://schemas.openxmlformats.org/presentationml/2006/main">
+  <p:cSld>
+    <p:spTree>
+      <p:nvGrpSpPr>
+        <p:cNvPr id="1" name=""/>
+        <p:cNvGrpSpPr/>
+        <p:nvPr/>
+      </p:nvGrpSpPr>
+      <p:grpSpPr>
+        <a:xfrm>
+          <a:off x="0" y="0"/>
+          <a:ext cx="0" cy="0"/>
+          <a:chOff x="0" y="0"/>
+          <a:chExt cx="0" cy="0"/>
+        </a:xfrm>
+      </p:grpSpPr>
+      <p:sp>
+        <p:nvSpPr>
+          <p:cNvPr id="2" name="제목 1">
+            <a:extLst>
+              <a:ext uri="{FF2B5EF4-FFF2-40B4-BE49-F238E27FC236}">
+                <a16:creationId xmlns:a16="http://schemas.microsoft.com/office/drawing/2014/main" id="{E126DC2B-16C1-4763-9EB8-0D522AC5921C}"/>
+              </a:ext>
+            </a:extLst>
+          </p:cNvPr>
+          <p:cNvSpPr>
+            <a:spLocks noGrp="1"/>
+          </p:cNvSpPr>
+          <p:nvPr>
+            <p:ph type="title"/>
+          </p:nvPr>
+        </p:nvSpPr>
+        <p:spPr/>
+        <p:txBody>
+          <a:bodyPr>
+            <a:normAutofit fontScale="90000"/>
+          </a:bodyPr>
+          <a:lstStyle/>
+          <a:p>
+            <a:r>
+              <a:rPr lang="en-US" altLang="ko-KR"/>
               <a:t>Test Fixure / Test case</a:t>
             </a:r>
             <a:endParaRPr lang="ko-KR" altLang="en-US"/>
@@ -6036,7 +6183,7 @@
 </p:sld>
 </file>
 
-<file path=ppt/slides/slide11.xml><?xml version="1.0" encoding="utf-8"?>
+<file path=ppt/slides/slide12.xml><?xml version="1.0" encoding="utf-8"?>
 <p:sld xmlns:a="http://schemas.openxmlformats.org/drawingml/2006/main" xmlns:r="http://schemas.openxmlformats.org/officeDocument/2006/relationships" xmlns:p="http://schemas.openxmlformats.org/presentationml/2006/main">
   <p:cSld>
     <p:spTree>
@@ -6123,7 +6270,7 @@
 </p:sld>
 </file>
 
-<file path=ppt/slides/slide12.xml><?xml version="1.0" encoding="utf-8"?>
+<file path=ppt/slides/slide13.xml><?xml version="1.0" encoding="utf-8"?>
 <p:sld xmlns:a="http://schemas.openxmlformats.org/drawingml/2006/main" xmlns:r="http://schemas.openxmlformats.org/officeDocument/2006/relationships" xmlns:p="http://schemas.openxmlformats.org/presentationml/2006/main">
   <p:cSld>
     <p:spTree>
@@ -6165,21 +6312,18 @@
           <a:p>
             <a:r>
               <a:rPr lang="en-US" altLang="ko-KR"/>
-              <a:t>Mocking </a:t>
-            </a:r>
-            <a:r>
-              <a:rPr lang="ko-KR" altLang="en-US"/>
-              <a:t>활용 예시</a:t>
-            </a:r>
+              <a:t>Nand device</a:t>
+            </a:r>
+            <a:endParaRPr lang="ko-KR" altLang="en-US"/>
           </a:p>
         </p:txBody>
       </p:sp>
       <p:sp>
         <p:nvSpPr>
-          <p:cNvPr id="3" name="텍스트 개체 틀 2">
+          <p:cNvPr id="5" name="텍스트 개체 틀 4">
             <a:extLst>
               <a:ext uri="{FF2B5EF4-FFF2-40B4-BE49-F238E27FC236}">
-                <a16:creationId xmlns:a16="http://schemas.microsoft.com/office/drawing/2014/main" id="{379AC7A0-B53D-489C-B3E5-10B54AEEA304}"/>
+                <a16:creationId xmlns:a16="http://schemas.microsoft.com/office/drawing/2014/main" id="{BD49FD13-7347-451E-BE34-6B3EA5767FB7}"/>
               </a:ext>
             </a:extLst>
           </p:cNvPr>
@@ -6195,113 +6339,44 @@
           <a:bodyPr/>
           <a:lstStyle/>
           <a:p>
-            <a:r>
-              <a:rPr lang="en-US" altLang="ko-KR"/>
-              <a:t>File reader</a:t>
-            </a:r>
-          </a:p>
-          <a:p>
-            <a:r>
-              <a:rPr lang="en-US" altLang="ko-KR"/>
-              <a:t>SSD deriver</a:t>
-            </a:r>
-          </a:p>
-          <a:p>
-            <a:r>
-              <a:rPr lang="en-US" altLang="ko-KR"/>
-              <a:t>Nand device</a:t>
-            </a:r>
             <a:endParaRPr lang="ko-KR" altLang="en-US"/>
           </a:p>
         </p:txBody>
       </p:sp>
+      <p:pic>
+        <p:nvPicPr>
+          <p:cNvPr id="9" name="그림 8">
+            <a:extLst>
+              <a:ext uri="{FF2B5EF4-FFF2-40B4-BE49-F238E27FC236}">
+                <a16:creationId xmlns:a16="http://schemas.microsoft.com/office/drawing/2014/main" id="{F978C1EC-3475-4C01-AEF0-E5EE4AED00EF}"/>
+              </a:ext>
+            </a:extLst>
+          </p:cNvPr>
+          <p:cNvPicPr>
+            <a:picLocks noChangeAspect="1"/>
+          </p:cNvPicPr>
+          <p:nvPr/>
+        </p:nvPicPr>
+        <p:blipFill>
+          <a:blip r:embed="rId2"/>
+          <a:stretch>
+            <a:fillRect/>
+          </a:stretch>
+        </p:blipFill>
+        <p:spPr>
+          <a:xfrm>
+            <a:off x="605980" y="1316376"/>
+            <a:ext cx="5419725" cy="4410075"/>
+          </a:xfrm>
+          <a:prstGeom prst="rect">
+            <a:avLst/>
+          </a:prstGeom>
+        </p:spPr>
+      </p:pic>
     </p:spTree>
     <p:extLst>
       <p:ext uri="{BB962C8B-B14F-4D97-AF65-F5344CB8AC3E}">
         <p14:creationId xmlns:p14="http://schemas.microsoft.com/office/powerpoint/2010/main" val="829816428"/>
-      </p:ext>
-    </p:extLst>
-  </p:cSld>
-  <p:clrMapOvr>
-    <a:masterClrMapping/>
-  </p:clrMapOvr>
-</p:sld>
-</file>
-
-<file path=ppt/slides/slide13.xml><?xml version="1.0" encoding="utf-8"?>
-<p:sld xmlns:a="http://schemas.openxmlformats.org/drawingml/2006/main" xmlns:r="http://schemas.openxmlformats.org/officeDocument/2006/relationships" xmlns:p="http://schemas.openxmlformats.org/presentationml/2006/main">
-  <p:cSld>
-    <p:spTree>
-      <p:nvGrpSpPr>
-        <p:cNvPr id="1" name="Shape 53"/>
-        <p:cNvGrpSpPr/>
-        <p:nvPr/>
-      </p:nvGrpSpPr>
-      <p:grpSpPr>
-        <a:xfrm>
-          <a:off x="0" y="0"/>
-          <a:ext cx="0" cy="0"/>
-          <a:chOff x="0" y="0"/>
-          <a:chExt cx="0" cy="0"/>
-        </a:xfrm>
-      </p:grpSpPr>
-      <p:sp>
-        <p:nvSpPr>
-          <p:cNvPr id="54" name="Google Shape;54;p2"/>
-          <p:cNvSpPr txBox="1">
-            <a:spLocks noGrp="1"/>
-          </p:cNvSpPr>
-          <p:nvPr>
-            <p:ph type="body" idx="1"/>
-          </p:nvPr>
-        </p:nvSpPr>
-        <p:spPr>
-          <a:xfrm>
-            <a:off x="1632000" y="1860184"/>
-            <a:ext cx="8928000" cy="2533083"/>
-          </a:xfrm>
-          <a:prstGeom prst="rect">
-            <a:avLst/>
-          </a:prstGeom>
-          <a:noFill/>
-          <a:ln>
-            <a:noFill/>
-          </a:ln>
-        </p:spPr>
-        <p:txBody>
-          <a:bodyPr spcFirstLastPara="1" wrap="square" lIns="0" tIns="45700" rIns="91425" bIns="45700" anchor="ctr" anchorCtr="0">
-            <a:noAutofit/>
-          </a:bodyPr>
-          <a:lstStyle/>
-          <a:p>
-            <a:pPr marL="0" lvl="0" indent="0" algn="ctr" rtl="0">
-              <a:lnSpc>
-                <a:spcPct val="90000"/>
-              </a:lnSpc>
-              <a:spcBef>
-                <a:spcPts val="0"/>
-              </a:spcBef>
-              <a:spcAft>
-                <a:spcPts val="0"/>
-              </a:spcAft>
-              <a:buClr>
-                <a:schemeClr val="dk1"/>
-              </a:buClr>
-              <a:buSzPts val="3200"/>
-              <a:buNone/>
-            </a:pPr>
-            <a:r>
-              <a:rPr lang="ko-KR" altLang="en-US"/>
-              <a:t>리팩토링</a:t>
-            </a:r>
-            <a:endParaRPr/>
-          </a:p>
-        </p:txBody>
-      </p:sp>
-    </p:spTree>
-    <p:extLst>
-      <p:ext uri="{BB962C8B-B14F-4D97-AF65-F5344CB8AC3E}">
-        <p14:creationId xmlns:p14="http://schemas.microsoft.com/office/powerpoint/2010/main" val="1821826519"/>
       </p:ext>
     </p:extLst>
   </p:cSld>
@@ -6333,7 +6408,7 @@
           <p:cNvPr id="2" name="제목 1">
             <a:extLst>
               <a:ext uri="{FF2B5EF4-FFF2-40B4-BE49-F238E27FC236}">
-                <a16:creationId xmlns:a16="http://schemas.microsoft.com/office/drawing/2014/main" id="{339DF875-8450-4FC2-B87E-F9DBA360D9B2}"/>
+                <a16:creationId xmlns:a16="http://schemas.microsoft.com/office/drawing/2014/main" id="{7CA6E275-E42D-455A-8319-2ABE16B52E86}"/>
               </a:ext>
             </a:extLst>
           </p:cNvPr>
@@ -6352,9 +6427,10 @@
           <a:lstStyle/>
           <a:p>
             <a:r>
-              <a:rPr lang="ko-KR" altLang="en-US"/>
-              <a:t>클린코드 전후 비교</a:t>
-            </a:r>
+              <a:rPr lang="en-US" altLang="ko-KR"/>
+              <a:t>FileReader &amp; SSDDriver</a:t>
+            </a:r>
+            <a:endParaRPr lang="ko-KR" altLang="en-US"/>
           </a:p>
         </p:txBody>
       </p:sp>
@@ -6363,7 +6439,7 @@
           <p:cNvPr id="3" name="텍스트 개체 틀 2">
             <a:extLst>
               <a:ext uri="{FF2B5EF4-FFF2-40B4-BE49-F238E27FC236}">
-                <a16:creationId xmlns:a16="http://schemas.microsoft.com/office/drawing/2014/main" id="{348A6CC5-097A-44E8-8418-8946CF1C9809}"/>
+                <a16:creationId xmlns:a16="http://schemas.microsoft.com/office/drawing/2014/main" id="{7B787FD8-4163-4D82-A621-EA9E76DADF36}"/>
               </a:ext>
             </a:extLst>
           </p:cNvPr>
@@ -6383,10 +6459,40 @@
           </a:p>
         </p:txBody>
       </p:sp>
+      <p:pic>
+        <p:nvPicPr>
+          <p:cNvPr id="5" name="그림 4">
+            <a:extLst>
+              <a:ext uri="{FF2B5EF4-FFF2-40B4-BE49-F238E27FC236}">
+                <a16:creationId xmlns:a16="http://schemas.microsoft.com/office/drawing/2014/main" id="{E8A1C801-5A48-4108-8C25-6129A2CF30DB}"/>
+              </a:ext>
+            </a:extLst>
+          </p:cNvPr>
+          <p:cNvPicPr>
+            <a:picLocks noChangeAspect="1"/>
+          </p:cNvPicPr>
+          <p:nvPr/>
+        </p:nvPicPr>
+        <p:blipFill>
+          <a:blip r:embed="rId2"/>
+          <a:stretch>
+            <a:fillRect/>
+          </a:stretch>
+        </p:blipFill>
+        <p:spPr>
+          <a:xfrm>
+            <a:off x="605980" y="1316376"/>
+            <a:ext cx="6677025" cy="3733800"/>
+          </a:xfrm>
+          <a:prstGeom prst="rect">
+            <a:avLst/>
+          </a:prstGeom>
+        </p:spPr>
+      </p:pic>
     </p:spTree>
     <p:extLst>
       <p:ext uri="{BB962C8B-B14F-4D97-AF65-F5344CB8AC3E}">
-        <p14:creationId xmlns:p14="http://schemas.microsoft.com/office/powerpoint/2010/main" val="1677564617"/>
+        <p14:creationId xmlns:p14="http://schemas.microsoft.com/office/powerpoint/2010/main" val="1727220812"/>
       </p:ext>
     </p:extLst>
   </p:cSld>
@@ -6460,6 +6566,174 @@
             </a:pPr>
             <a:r>
               <a:rPr lang="ko-KR" altLang="en-US"/>
+              <a:t>리팩토링을 통한 클린 코드</a:t>
+            </a:r>
+            <a:endParaRPr/>
+          </a:p>
+        </p:txBody>
+      </p:sp>
+    </p:spTree>
+    <p:extLst>
+      <p:ext uri="{BB962C8B-B14F-4D97-AF65-F5344CB8AC3E}">
+        <p14:creationId xmlns:p14="http://schemas.microsoft.com/office/powerpoint/2010/main" val="1821826519"/>
+      </p:ext>
+    </p:extLst>
+  </p:cSld>
+  <p:clrMapOvr>
+    <a:masterClrMapping/>
+  </p:clrMapOvr>
+</p:sld>
+</file>
+
+<file path=ppt/slides/slide16.xml><?xml version="1.0" encoding="utf-8"?>
+<p:sld xmlns:a="http://schemas.openxmlformats.org/drawingml/2006/main" xmlns:r="http://schemas.openxmlformats.org/officeDocument/2006/relationships" xmlns:p="http://schemas.openxmlformats.org/presentationml/2006/main">
+  <p:cSld>
+    <p:spTree>
+      <p:nvGrpSpPr>
+        <p:cNvPr id="1" name=""/>
+        <p:cNvGrpSpPr/>
+        <p:nvPr/>
+      </p:nvGrpSpPr>
+      <p:grpSpPr>
+        <a:xfrm>
+          <a:off x="0" y="0"/>
+          <a:ext cx="0" cy="0"/>
+          <a:chOff x="0" y="0"/>
+          <a:chExt cx="0" cy="0"/>
+        </a:xfrm>
+      </p:grpSpPr>
+      <p:sp>
+        <p:nvSpPr>
+          <p:cNvPr id="2" name="제목 1">
+            <a:extLst>
+              <a:ext uri="{FF2B5EF4-FFF2-40B4-BE49-F238E27FC236}">
+                <a16:creationId xmlns:a16="http://schemas.microsoft.com/office/drawing/2014/main" id="{339DF875-8450-4FC2-B87E-F9DBA360D9B2}"/>
+              </a:ext>
+            </a:extLst>
+          </p:cNvPr>
+          <p:cNvSpPr>
+            <a:spLocks noGrp="1"/>
+          </p:cNvSpPr>
+          <p:nvPr>
+            <p:ph type="title"/>
+          </p:nvPr>
+        </p:nvSpPr>
+        <p:spPr/>
+        <p:txBody>
+          <a:bodyPr>
+            <a:normAutofit fontScale="90000"/>
+          </a:bodyPr>
+          <a:lstStyle/>
+          <a:p>
+            <a:r>
+              <a:rPr lang="ko-KR" altLang="en-US"/>
+              <a:t>전후 결과 비교</a:t>
+            </a:r>
+          </a:p>
+        </p:txBody>
+      </p:sp>
+      <p:sp>
+        <p:nvSpPr>
+          <p:cNvPr id="3" name="텍스트 개체 틀 2">
+            <a:extLst>
+              <a:ext uri="{FF2B5EF4-FFF2-40B4-BE49-F238E27FC236}">
+                <a16:creationId xmlns:a16="http://schemas.microsoft.com/office/drawing/2014/main" id="{348A6CC5-097A-44E8-8418-8946CF1C9809}"/>
+              </a:ext>
+            </a:extLst>
+          </p:cNvPr>
+          <p:cNvSpPr>
+            <a:spLocks noGrp="1"/>
+          </p:cNvSpPr>
+          <p:nvPr>
+            <p:ph type="body" idx="1"/>
+          </p:nvPr>
+        </p:nvSpPr>
+        <p:spPr/>
+        <p:txBody>
+          <a:bodyPr/>
+          <a:lstStyle/>
+          <a:p>
+            <a:endParaRPr lang="ko-KR" altLang="en-US"/>
+          </a:p>
+        </p:txBody>
+      </p:sp>
+    </p:spTree>
+    <p:extLst>
+      <p:ext uri="{BB962C8B-B14F-4D97-AF65-F5344CB8AC3E}">
+        <p14:creationId xmlns:p14="http://schemas.microsoft.com/office/powerpoint/2010/main" val="1677564617"/>
+      </p:ext>
+    </p:extLst>
+  </p:cSld>
+  <p:clrMapOvr>
+    <a:masterClrMapping/>
+  </p:clrMapOvr>
+</p:sld>
+</file>
+
+<file path=ppt/slides/slide17.xml><?xml version="1.0" encoding="utf-8"?>
+<p:sld xmlns:a="http://schemas.openxmlformats.org/drawingml/2006/main" xmlns:r="http://schemas.openxmlformats.org/officeDocument/2006/relationships" xmlns:p="http://schemas.openxmlformats.org/presentationml/2006/main">
+  <p:cSld>
+    <p:spTree>
+      <p:nvGrpSpPr>
+        <p:cNvPr id="1" name="Shape 53"/>
+        <p:cNvGrpSpPr/>
+        <p:nvPr/>
+      </p:nvGrpSpPr>
+      <p:grpSpPr>
+        <a:xfrm>
+          <a:off x="0" y="0"/>
+          <a:ext cx="0" cy="0"/>
+          <a:chOff x="0" y="0"/>
+          <a:chExt cx="0" cy="0"/>
+        </a:xfrm>
+      </p:grpSpPr>
+      <p:sp>
+        <p:nvSpPr>
+          <p:cNvPr id="54" name="Google Shape;54;p2"/>
+          <p:cNvSpPr txBox="1">
+            <a:spLocks noGrp="1"/>
+          </p:cNvSpPr>
+          <p:nvPr>
+            <p:ph type="body" idx="1"/>
+          </p:nvPr>
+        </p:nvSpPr>
+        <p:spPr>
+          <a:xfrm>
+            <a:off x="1632000" y="1860184"/>
+            <a:ext cx="8928000" cy="2533083"/>
+          </a:xfrm>
+          <a:prstGeom prst="rect">
+            <a:avLst/>
+          </a:prstGeom>
+          <a:noFill/>
+          <a:ln>
+            <a:noFill/>
+          </a:ln>
+        </p:spPr>
+        <p:txBody>
+          <a:bodyPr spcFirstLastPara="1" wrap="square" lIns="0" tIns="45700" rIns="91425" bIns="45700" anchor="ctr" anchorCtr="0">
+            <a:noAutofit/>
+          </a:bodyPr>
+          <a:lstStyle/>
+          <a:p>
+            <a:pPr marL="0" lvl="0" indent="0" algn="ctr" rtl="0">
+              <a:lnSpc>
+                <a:spcPct val="90000"/>
+              </a:lnSpc>
+              <a:spcBef>
+                <a:spcPts val="0"/>
+              </a:spcBef>
+              <a:spcAft>
+                <a:spcPts val="0"/>
+              </a:spcAft>
+              <a:buClr>
+                <a:schemeClr val="dk1"/>
+              </a:buClr>
+              <a:buSzPts val="3200"/>
+              <a:buNone/>
+            </a:pPr>
+            <a:r>
+              <a:rPr lang="ko-KR" altLang="en-US"/>
               <a:t>소감</a:t>
             </a:r>
             <a:endParaRPr/>
@@ -6479,7 +6753,7 @@
 </p:sld>
 </file>
 
-<file path=ppt/slides/slide16.xml><?xml version="1.0" encoding="utf-8"?>
+<file path=ppt/slides/slide18.xml><?xml version="1.0" encoding="utf-8"?>
 <p:sld xmlns:a="http://schemas.openxmlformats.org/drawingml/2006/main" xmlns:r="http://schemas.openxmlformats.org/officeDocument/2006/relationships" xmlns:p="http://schemas.openxmlformats.org/presentationml/2006/main">
   <p:cSld>
     <p:spTree>
@@ -6889,7 +7163,7 @@
 </p:sld>
 </file>
 
-<file path=ppt/slides/slide17.xml><?xml version="1.0" encoding="utf-8"?>
+<file path=ppt/slides/slide19.xml><?xml version="1.0" encoding="utf-8"?>
 <p:sld xmlns:a="http://schemas.openxmlformats.org/drawingml/2006/main" xmlns:r="http://schemas.openxmlformats.org/officeDocument/2006/relationships" xmlns:p="http://schemas.openxmlformats.org/presentationml/2006/main">
   <p:cSld>
     <p:spTree>
@@ -8966,6 +9240,126 @@
   <p:cSld>
     <p:spTree>
       <p:nvGrpSpPr>
+        <p:cNvPr id="1" name=""/>
+        <p:cNvGrpSpPr/>
+        <p:nvPr/>
+      </p:nvGrpSpPr>
+      <p:grpSpPr>
+        <a:xfrm>
+          <a:off x="0" y="0"/>
+          <a:ext cx="0" cy="0"/>
+          <a:chOff x="0" y="0"/>
+          <a:chExt cx="0" cy="0"/>
+        </a:xfrm>
+      </p:grpSpPr>
+      <p:sp>
+        <p:nvSpPr>
+          <p:cNvPr id="2" name="제목 1">
+            <a:extLst>
+              <a:ext uri="{FF2B5EF4-FFF2-40B4-BE49-F238E27FC236}">
+                <a16:creationId xmlns:a16="http://schemas.microsoft.com/office/drawing/2014/main" id="{1B7259D9-6342-4C58-8050-5CA5698117F2}"/>
+              </a:ext>
+            </a:extLst>
+          </p:cNvPr>
+          <p:cNvSpPr>
+            <a:spLocks noGrp="1"/>
+          </p:cNvSpPr>
+          <p:nvPr>
+            <p:ph type="title"/>
+          </p:nvPr>
+        </p:nvSpPr>
+        <p:spPr/>
+        <p:txBody>
+          <a:bodyPr>
+            <a:normAutofit fontScale="90000"/>
+          </a:bodyPr>
+          <a:lstStyle/>
+          <a:p>
+            <a:r>
+              <a:rPr lang="ko-KR" altLang="en-US"/>
+              <a:t>디자인 패턴 </a:t>
+            </a:r>
+            <a:r>
+              <a:rPr lang="en-US" altLang="ko-KR"/>
+              <a:t>- Singletone</a:t>
+            </a:r>
+            <a:endParaRPr lang="ko-KR" altLang="en-US"/>
+          </a:p>
+        </p:txBody>
+      </p:sp>
+      <p:sp>
+        <p:nvSpPr>
+          <p:cNvPr id="3" name="텍스트 개체 틀 2">
+            <a:extLst>
+              <a:ext uri="{FF2B5EF4-FFF2-40B4-BE49-F238E27FC236}">
+                <a16:creationId xmlns:a16="http://schemas.microsoft.com/office/drawing/2014/main" id="{FC46BE82-9CA8-485C-83B1-598587BF066A}"/>
+              </a:ext>
+            </a:extLst>
+          </p:cNvPr>
+          <p:cNvSpPr>
+            <a:spLocks noGrp="1"/>
+          </p:cNvSpPr>
+          <p:nvPr>
+            <p:ph type="body" idx="1"/>
+          </p:nvPr>
+        </p:nvSpPr>
+        <p:spPr/>
+        <p:txBody>
+          <a:bodyPr/>
+          <a:lstStyle/>
+          <a:p>
+            <a:endParaRPr lang="ko-KR" altLang="en-US"/>
+          </a:p>
+        </p:txBody>
+      </p:sp>
+      <p:pic>
+        <p:nvPicPr>
+          <p:cNvPr id="5" name="그림 4">
+            <a:extLst>
+              <a:ext uri="{FF2B5EF4-FFF2-40B4-BE49-F238E27FC236}">
+                <a16:creationId xmlns:a16="http://schemas.microsoft.com/office/drawing/2014/main" id="{19D0C611-1AC0-430C-B6C1-610E40B71608}"/>
+              </a:ext>
+            </a:extLst>
+          </p:cNvPr>
+          <p:cNvPicPr>
+            <a:picLocks noChangeAspect="1"/>
+          </p:cNvPicPr>
+          <p:nvPr/>
+        </p:nvPicPr>
+        <p:blipFill>
+          <a:blip r:embed="rId2"/>
+          <a:stretch>
+            <a:fillRect/>
+          </a:stretch>
+        </p:blipFill>
+        <p:spPr>
+          <a:xfrm>
+            <a:off x="605980" y="1316376"/>
+            <a:ext cx="8029575" cy="3257550"/>
+          </a:xfrm>
+          <a:prstGeom prst="rect">
+            <a:avLst/>
+          </a:prstGeom>
+        </p:spPr>
+      </p:pic>
+    </p:spTree>
+    <p:extLst>
+      <p:ext uri="{BB962C8B-B14F-4D97-AF65-F5344CB8AC3E}">
+        <p14:creationId xmlns:p14="http://schemas.microsoft.com/office/powerpoint/2010/main" val="2663244451"/>
+      </p:ext>
+    </p:extLst>
+  </p:cSld>
+  <p:clrMapOvr>
+    <a:masterClrMapping/>
+  </p:clrMapOvr>
+</p:sld>
+</file>
+
+<file path=ppt/slides/slide9.xml><?xml version="1.0" encoding="utf-8"?>
+<p:sld xmlns:a="http://schemas.openxmlformats.org/drawingml/2006/main" xmlns:r="http://schemas.openxmlformats.org/officeDocument/2006/relationships" xmlns:p="http://schemas.openxmlformats.org/presentationml/2006/main">
+  <p:cSld>
+    <p:spTree>
+      <p:nvGrpSpPr>
         <p:cNvPr id="1" name="Shape 53"/>
         <p:cNvGrpSpPr/>
         <p:nvPr/>
@@ -9039,96 +9433,6 @@
     <p:extLst>
       <p:ext uri="{BB962C8B-B14F-4D97-AF65-F5344CB8AC3E}">
         <p14:creationId xmlns:p14="http://schemas.microsoft.com/office/powerpoint/2010/main" val="4056276162"/>
-      </p:ext>
-    </p:extLst>
-  </p:cSld>
-  <p:clrMapOvr>
-    <a:masterClrMapping/>
-  </p:clrMapOvr>
-</p:sld>
-</file>
-
-<file path=ppt/slides/slide9.xml><?xml version="1.0" encoding="utf-8"?>
-<p:sld xmlns:a="http://schemas.openxmlformats.org/drawingml/2006/main" xmlns:r="http://schemas.openxmlformats.org/officeDocument/2006/relationships" xmlns:p="http://schemas.openxmlformats.org/presentationml/2006/main">
-  <p:cSld>
-    <p:spTree>
-      <p:nvGrpSpPr>
-        <p:cNvPr id="1" name=""/>
-        <p:cNvGrpSpPr/>
-        <p:nvPr/>
-      </p:nvGrpSpPr>
-      <p:grpSpPr>
-        <a:xfrm>
-          <a:off x="0" y="0"/>
-          <a:ext cx="0" cy="0"/>
-          <a:chOff x="0" y="0"/>
-          <a:chExt cx="0" cy="0"/>
-        </a:xfrm>
-      </p:grpSpPr>
-      <p:sp>
-        <p:nvSpPr>
-          <p:cNvPr id="2" name="제목 1">
-            <a:extLst>
-              <a:ext uri="{FF2B5EF4-FFF2-40B4-BE49-F238E27FC236}">
-                <a16:creationId xmlns:a16="http://schemas.microsoft.com/office/drawing/2014/main" id="{E126DC2B-16C1-4763-9EB8-0D522AC5921C}"/>
-              </a:ext>
-            </a:extLst>
-          </p:cNvPr>
-          <p:cNvSpPr>
-            <a:spLocks noGrp="1"/>
-          </p:cNvSpPr>
-          <p:nvPr>
-            <p:ph type="title"/>
-          </p:nvPr>
-        </p:nvSpPr>
-        <p:spPr/>
-        <p:txBody>
-          <a:bodyPr>
-            <a:normAutofit fontScale="90000"/>
-          </a:bodyPr>
-          <a:lstStyle/>
-          <a:p>
-            <a:r>
-              <a:rPr lang="en-US" altLang="ko-KR"/>
-              <a:t>Code Coverage</a:t>
-            </a:r>
-            <a:endParaRPr lang="ko-KR" altLang="en-US"/>
-          </a:p>
-        </p:txBody>
-      </p:sp>
-      <p:sp>
-        <p:nvSpPr>
-          <p:cNvPr id="3" name="텍스트 개체 틀 2">
-            <a:extLst>
-              <a:ext uri="{FF2B5EF4-FFF2-40B4-BE49-F238E27FC236}">
-                <a16:creationId xmlns:a16="http://schemas.microsoft.com/office/drawing/2014/main" id="{B33CD206-7167-45B3-B4BE-F0BFA702F8C9}"/>
-              </a:ext>
-            </a:extLst>
-          </p:cNvPr>
-          <p:cNvSpPr>
-            <a:spLocks noGrp="1"/>
-          </p:cNvSpPr>
-          <p:nvPr>
-            <p:ph type="body" idx="1"/>
-          </p:nvPr>
-        </p:nvSpPr>
-        <p:spPr/>
-        <p:txBody>
-          <a:bodyPr/>
-          <a:lstStyle/>
-          <a:p>
-            <a:r>
-              <a:rPr lang="en-US" altLang="ko-KR"/>
-              <a:t>Coverage</a:t>
-            </a:r>
-            <a:endParaRPr lang="ko-KR" altLang="en-US"/>
-          </a:p>
-        </p:txBody>
-      </p:sp>
-    </p:spTree>
-    <p:extLst>
-      <p:ext uri="{BB962C8B-B14F-4D97-AF65-F5344CB8AC3E}">
-        <p14:creationId xmlns:p14="http://schemas.microsoft.com/office/powerpoint/2010/main" val="3477409895"/>
       </p:ext>
     </p:extLst>
   </p:cSld>

</xml_diff>